<commit_message>
changes to template and ppt
</commit_message>
<xml_diff>
--- a/JS Callbacks and Events.pptx
+++ b/JS Callbacks and Events.pptx
@@ -296,7 +296,7 @@
           <a:p>
             <a:fld id="{227C3D9B-C1D3-45C7-A957-294645C46AEE}" type="datetimeFigureOut">
               <a:rPr lang="en-US" smtClean="0"/>
-              <a:t>1/7/2014</a:t>
+              <a:t>1/8/2014</a:t>
             </a:fld>
             <a:endParaRPr lang="en-US"/>
           </a:p>
@@ -466,7 +466,7 @@
           <a:p>
             <a:fld id="{227C3D9B-C1D3-45C7-A957-294645C46AEE}" type="datetimeFigureOut">
               <a:rPr lang="en-US" smtClean="0"/>
-              <a:t>1/7/2014</a:t>
+              <a:t>1/8/2014</a:t>
             </a:fld>
             <a:endParaRPr lang="en-US"/>
           </a:p>
@@ -646,7 +646,7 @@
           <a:p>
             <a:fld id="{227C3D9B-C1D3-45C7-A957-294645C46AEE}" type="datetimeFigureOut">
               <a:rPr lang="en-US" smtClean="0"/>
-              <a:t>1/7/2014</a:t>
+              <a:t>1/8/2014</a:t>
             </a:fld>
             <a:endParaRPr lang="en-US"/>
           </a:p>
@@ -816,7 +816,7 @@
           <a:p>
             <a:fld id="{227C3D9B-C1D3-45C7-A957-294645C46AEE}" type="datetimeFigureOut">
               <a:rPr lang="en-US" smtClean="0"/>
-              <a:t>1/7/2014</a:t>
+              <a:t>1/8/2014</a:t>
             </a:fld>
             <a:endParaRPr lang="en-US"/>
           </a:p>
@@ -1062,7 +1062,7 @@
           <a:p>
             <a:fld id="{227C3D9B-C1D3-45C7-A957-294645C46AEE}" type="datetimeFigureOut">
               <a:rPr lang="en-US" smtClean="0"/>
-              <a:t>1/7/2014</a:t>
+              <a:t>1/8/2014</a:t>
             </a:fld>
             <a:endParaRPr lang="en-US"/>
           </a:p>
@@ -1350,7 +1350,7 @@
           <a:p>
             <a:fld id="{227C3D9B-C1D3-45C7-A957-294645C46AEE}" type="datetimeFigureOut">
               <a:rPr lang="en-US" smtClean="0"/>
-              <a:t>1/7/2014</a:t>
+              <a:t>1/8/2014</a:t>
             </a:fld>
             <a:endParaRPr lang="en-US"/>
           </a:p>
@@ -1772,7 +1772,7 @@
           <a:p>
             <a:fld id="{227C3D9B-C1D3-45C7-A957-294645C46AEE}" type="datetimeFigureOut">
               <a:rPr lang="en-US" smtClean="0"/>
-              <a:t>1/7/2014</a:t>
+              <a:t>1/8/2014</a:t>
             </a:fld>
             <a:endParaRPr lang="en-US"/>
           </a:p>
@@ -1890,7 +1890,7 @@
           <a:p>
             <a:fld id="{227C3D9B-C1D3-45C7-A957-294645C46AEE}" type="datetimeFigureOut">
               <a:rPr lang="en-US" smtClean="0"/>
-              <a:t>1/7/2014</a:t>
+              <a:t>1/8/2014</a:t>
             </a:fld>
             <a:endParaRPr lang="en-US"/>
           </a:p>
@@ -1985,7 +1985,7 @@
           <a:p>
             <a:fld id="{227C3D9B-C1D3-45C7-A957-294645C46AEE}" type="datetimeFigureOut">
               <a:rPr lang="en-US" smtClean="0"/>
-              <a:t>1/7/2014</a:t>
+              <a:t>1/8/2014</a:t>
             </a:fld>
             <a:endParaRPr lang="en-US"/>
           </a:p>
@@ -2262,7 +2262,7 @@
           <a:p>
             <a:fld id="{227C3D9B-C1D3-45C7-A957-294645C46AEE}" type="datetimeFigureOut">
               <a:rPr lang="en-US" smtClean="0"/>
-              <a:t>1/7/2014</a:t>
+              <a:t>1/8/2014</a:t>
             </a:fld>
             <a:endParaRPr lang="en-US"/>
           </a:p>
@@ -2515,7 +2515,7 @@
           <a:p>
             <a:fld id="{227C3D9B-C1D3-45C7-A957-294645C46AEE}" type="datetimeFigureOut">
               <a:rPr lang="en-US" smtClean="0"/>
-              <a:t>1/7/2014</a:t>
+              <a:t>1/8/2014</a:t>
             </a:fld>
             <a:endParaRPr lang="en-US"/>
           </a:p>
@@ -2728,7 +2728,7 @@
           <a:p>
             <a:fld id="{227C3D9B-C1D3-45C7-A957-294645C46AEE}" type="datetimeFigureOut">
               <a:rPr lang="en-US" smtClean="0"/>
-              <a:t>1/7/2014</a:t>
+              <a:t>1/8/2014</a:t>
             </a:fld>
             <a:endParaRPr lang="en-US"/>
           </a:p>
@@ -3219,13 +3219,30 @@
           <a:p>
             <a:r>
               <a:rPr lang="en-US" dirty="0" smtClean="0"/>
-              <a:t>In the mythical land of JS….</a:t>
-            </a:r>
-          </a:p>
-          <a:p>
+              <a:t>In the mythical land of JS</a:t>
+            </a:r>
             <a:r>
               <a:rPr lang="en-US" dirty="0" smtClean="0"/>
-              <a:t>“Cut the crap already and get to some examples!”</a:t>
+              <a:t>…. there was something called a callback</a:t>
+            </a:r>
+            <a:endParaRPr lang="en-US" dirty="0" smtClean="0"/>
+          </a:p>
+          <a:p>
+            <a:r>
+              <a:rPr lang="en-US" dirty="0" smtClean="0"/>
+              <a:t>“Cut </a:t>
+            </a:r>
+            <a:r>
+              <a:rPr lang="en-US" smtClean="0"/>
+              <a:t>the </a:t>
+            </a:r>
+            <a:r>
+              <a:rPr lang="en-US" smtClean="0"/>
+              <a:t>theoretical crap </a:t>
+            </a:r>
+            <a:r>
+              <a:rPr lang="en-US" dirty="0" smtClean="0"/>
+              <a:t>already and get to some examples!”</a:t>
             </a:r>
           </a:p>
           <a:p>
@@ -3284,7 +3301,11 @@
           <a:bodyPr/>
           <a:lstStyle/>
           <a:p>
-            <a:endParaRPr lang="en-US"/>
+            <a:r>
+              <a:rPr lang="en-US" dirty="0" smtClean="0"/>
+              <a:t>Callbacks</a:t>
+            </a:r>
+            <a:endParaRPr lang="en-US" dirty="0"/>
           </a:p>
         </p:txBody>
       </p:sp>

</xml_diff>